<commit_message>
#331: updated architecture diagram
git-svn-id: https://src.heuristiclab.com/svn/core/trunk@7613 2abd9481-f8db-48e9-bd25-06bc13291c1b
</commit_message>
<xml_diff>
--- a/documentation/HeuristicLab 3.3 Architecture.pptx
+++ b/documentation/HeuristicLab 3.3 Architecture.pptx
@@ -288,7 +288,7 @@
           <a:p>
             <a:fld id="{DA48B841-176A-4F14-B85B-02032543DE0F}" type="datetimeFigureOut">
               <a:rPr lang="de-AT" smtClean="0"/>
-              <a:t>13.03.2012</a:t>
+              <a:t>14.03.2012</a:t>
             </a:fld>
             <a:endParaRPr lang="de-AT"/>
           </a:p>
@@ -330,7 +330,7 @@
           <a:p>
             <a:fld id="{836B6E62-D470-446C-A6F9-E2F3AAB40117}" type="slidenum">
               <a:rPr lang="de-AT" smtClean="0"/>
-              <a:t>‹#›</a:t>
+              <a:t>‹Nr.›</a:t>
             </a:fld>
             <a:endParaRPr lang="de-AT"/>
           </a:p>
@@ -453,7 +453,7 @@
           <a:p>
             <a:fld id="{DA48B841-176A-4F14-B85B-02032543DE0F}" type="datetimeFigureOut">
               <a:rPr lang="de-AT" smtClean="0"/>
-              <a:t>13.03.2012</a:t>
+              <a:t>14.03.2012</a:t>
             </a:fld>
             <a:endParaRPr lang="de-AT"/>
           </a:p>
@@ -495,7 +495,7 @@
           <a:p>
             <a:fld id="{836B6E62-D470-446C-A6F9-E2F3AAB40117}" type="slidenum">
               <a:rPr lang="de-AT" smtClean="0"/>
-              <a:t>‹#›</a:t>
+              <a:t>‹Nr.›</a:t>
             </a:fld>
             <a:endParaRPr lang="de-AT"/>
           </a:p>
@@ -628,7 +628,7 @@
           <a:p>
             <a:fld id="{DA48B841-176A-4F14-B85B-02032543DE0F}" type="datetimeFigureOut">
               <a:rPr lang="de-AT" smtClean="0"/>
-              <a:t>13.03.2012</a:t>
+              <a:t>14.03.2012</a:t>
             </a:fld>
             <a:endParaRPr lang="de-AT"/>
           </a:p>
@@ -670,7 +670,7 @@
           <a:p>
             <a:fld id="{836B6E62-D470-446C-A6F9-E2F3AAB40117}" type="slidenum">
               <a:rPr lang="de-AT" smtClean="0"/>
-              <a:t>‹#›</a:t>
+              <a:t>‹Nr.›</a:t>
             </a:fld>
             <a:endParaRPr lang="de-AT"/>
           </a:p>
@@ -793,7 +793,7 @@
           <a:p>
             <a:fld id="{DA48B841-176A-4F14-B85B-02032543DE0F}" type="datetimeFigureOut">
               <a:rPr lang="de-AT" smtClean="0"/>
-              <a:t>13.03.2012</a:t>
+              <a:t>14.03.2012</a:t>
             </a:fld>
             <a:endParaRPr lang="de-AT"/>
           </a:p>
@@ -835,7 +835,7 @@
           <a:p>
             <a:fld id="{836B6E62-D470-446C-A6F9-E2F3AAB40117}" type="slidenum">
               <a:rPr lang="de-AT" smtClean="0"/>
-              <a:t>‹#›</a:t>
+              <a:t>‹Nr.›</a:t>
             </a:fld>
             <a:endParaRPr lang="de-AT"/>
           </a:p>
@@ -1034,7 +1034,7 @@
           <a:p>
             <a:fld id="{DA48B841-176A-4F14-B85B-02032543DE0F}" type="datetimeFigureOut">
               <a:rPr lang="de-AT" smtClean="0"/>
-              <a:t>13.03.2012</a:t>
+              <a:t>14.03.2012</a:t>
             </a:fld>
             <a:endParaRPr lang="de-AT"/>
           </a:p>
@@ -1076,7 +1076,7 @@
           <a:p>
             <a:fld id="{836B6E62-D470-446C-A6F9-E2F3AAB40117}" type="slidenum">
               <a:rPr lang="de-AT" smtClean="0"/>
-              <a:t>‹#›</a:t>
+              <a:t>‹Nr.›</a:t>
             </a:fld>
             <a:endParaRPr lang="de-AT"/>
           </a:p>
@@ -1317,7 +1317,7 @@
           <a:p>
             <a:fld id="{DA48B841-176A-4F14-B85B-02032543DE0F}" type="datetimeFigureOut">
               <a:rPr lang="de-AT" smtClean="0"/>
-              <a:t>13.03.2012</a:t>
+              <a:t>14.03.2012</a:t>
             </a:fld>
             <a:endParaRPr lang="de-AT"/>
           </a:p>
@@ -1359,7 +1359,7 @@
           <a:p>
             <a:fld id="{836B6E62-D470-446C-A6F9-E2F3AAB40117}" type="slidenum">
               <a:rPr lang="de-AT" smtClean="0"/>
-              <a:t>‹#›</a:t>
+              <a:t>‹Nr.›</a:t>
             </a:fld>
             <a:endParaRPr lang="de-AT"/>
           </a:p>
@@ -1734,7 +1734,7 @@
           <a:p>
             <a:fld id="{DA48B841-176A-4F14-B85B-02032543DE0F}" type="datetimeFigureOut">
               <a:rPr lang="de-AT" smtClean="0"/>
-              <a:t>13.03.2012</a:t>
+              <a:t>14.03.2012</a:t>
             </a:fld>
             <a:endParaRPr lang="de-AT"/>
           </a:p>
@@ -1776,7 +1776,7 @@
           <a:p>
             <a:fld id="{836B6E62-D470-446C-A6F9-E2F3AAB40117}" type="slidenum">
               <a:rPr lang="de-AT" smtClean="0"/>
-              <a:t>‹#›</a:t>
+              <a:t>‹Nr.›</a:t>
             </a:fld>
             <a:endParaRPr lang="de-AT"/>
           </a:p>
@@ -1847,7 +1847,7 @@
           <a:p>
             <a:fld id="{DA48B841-176A-4F14-B85B-02032543DE0F}" type="datetimeFigureOut">
               <a:rPr lang="de-AT" smtClean="0"/>
-              <a:t>13.03.2012</a:t>
+              <a:t>14.03.2012</a:t>
             </a:fld>
             <a:endParaRPr lang="de-AT"/>
           </a:p>
@@ -1889,7 +1889,7 @@
           <a:p>
             <a:fld id="{836B6E62-D470-446C-A6F9-E2F3AAB40117}" type="slidenum">
               <a:rPr lang="de-AT" smtClean="0"/>
-              <a:t>‹#›</a:t>
+              <a:t>‹Nr.›</a:t>
             </a:fld>
             <a:endParaRPr lang="de-AT"/>
           </a:p>
@@ -1937,7 +1937,7 @@
           <a:p>
             <a:fld id="{DA48B841-176A-4F14-B85B-02032543DE0F}" type="datetimeFigureOut">
               <a:rPr lang="de-AT" smtClean="0"/>
-              <a:t>13.03.2012</a:t>
+              <a:t>14.03.2012</a:t>
             </a:fld>
             <a:endParaRPr lang="de-AT"/>
           </a:p>
@@ -1979,7 +1979,7 @@
           <a:p>
             <a:fld id="{836B6E62-D470-446C-A6F9-E2F3AAB40117}" type="slidenum">
               <a:rPr lang="de-AT" smtClean="0"/>
-              <a:t>‹#›</a:t>
+              <a:t>‹Nr.›</a:t>
             </a:fld>
             <a:endParaRPr lang="de-AT"/>
           </a:p>
@@ -2209,7 +2209,7 @@
           <a:p>
             <a:fld id="{DA48B841-176A-4F14-B85B-02032543DE0F}" type="datetimeFigureOut">
               <a:rPr lang="de-AT" smtClean="0"/>
-              <a:t>13.03.2012</a:t>
+              <a:t>14.03.2012</a:t>
             </a:fld>
             <a:endParaRPr lang="de-AT"/>
           </a:p>
@@ -2251,7 +2251,7 @@
           <a:p>
             <a:fld id="{836B6E62-D470-446C-A6F9-E2F3AAB40117}" type="slidenum">
               <a:rPr lang="de-AT" smtClean="0"/>
-              <a:t>‹#›</a:t>
+              <a:t>‹Nr.›</a:t>
             </a:fld>
             <a:endParaRPr lang="de-AT"/>
           </a:p>
@@ -2457,7 +2457,7 @@
           <a:p>
             <a:fld id="{DA48B841-176A-4F14-B85B-02032543DE0F}" type="datetimeFigureOut">
               <a:rPr lang="de-AT" smtClean="0"/>
-              <a:t>13.03.2012</a:t>
+              <a:t>14.03.2012</a:t>
             </a:fld>
             <a:endParaRPr lang="de-AT"/>
           </a:p>
@@ -2499,7 +2499,7 @@
           <a:p>
             <a:fld id="{836B6E62-D470-446C-A6F9-E2F3AAB40117}" type="slidenum">
               <a:rPr lang="de-AT" smtClean="0"/>
-              <a:t>‹#›</a:t>
+              <a:t>‹Nr.›</a:t>
             </a:fld>
             <a:endParaRPr lang="de-AT"/>
           </a:p>
@@ -2665,7 +2665,7 @@
           <a:p>
             <a:fld id="{DA48B841-176A-4F14-B85B-02032543DE0F}" type="datetimeFigureOut">
               <a:rPr lang="de-AT" smtClean="0"/>
-              <a:t>13.03.2012</a:t>
+              <a:t>14.03.2012</a:t>
             </a:fld>
             <a:endParaRPr lang="de-AT"/>
           </a:p>
@@ -2743,7 +2743,7 @@
           <a:p>
             <a:fld id="{836B6E62-D470-446C-A6F9-E2F3AAB40117}" type="slidenum">
               <a:rPr lang="de-AT" smtClean="0"/>
-              <a:t>‹#›</a:t>
+              <a:t>‹Nr.›</a:t>
             </a:fld>
             <a:endParaRPr lang="de-AT"/>
           </a:p>
@@ -3483,8 +3483,8 @@
         </p:nvSpPr>
         <p:spPr>
           <a:xfrm>
-            <a:off x="1475656" y="3140968"/>
-            <a:ext cx="1656184" cy="331237"/>
+            <a:off x="1907704" y="3140963"/>
+            <a:ext cx="2952328" cy="331237"/>
           </a:xfrm>
           <a:prstGeom prst="rect">
             <a:avLst/>
@@ -3527,8 +3527,8 @@
         </p:nvSpPr>
         <p:spPr>
           <a:xfrm>
-            <a:off x="3203848" y="3140968"/>
-            <a:ext cx="1656184" cy="331237"/>
+            <a:off x="395536" y="3140967"/>
+            <a:ext cx="1440160" cy="331237"/>
           </a:xfrm>
           <a:prstGeom prst="rect">
             <a:avLst/>
@@ -3557,7 +3557,7 @@
             <a:pPr algn="ctr"/>
             <a:r>
               <a:rPr lang="de-AT" sz="1400" dirty="0" smtClean="0"/>
-              <a:t>*Engine</a:t>
+              <a:t>.*Engine</a:t>
             </a:r>
             <a:endParaRPr lang="de-AT" sz="1400" dirty="0"/>
           </a:p>
@@ -3601,7 +3601,7 @@
             <a:pPr algn="ctr"/>
             <a:r>
               <a:rPr lang="de-AT" sz="1400" dirty="0" smtClean="0"/>
-              <a:t>*Encoding</a:t>
+              <a:t>Encodings.*</a:t>
             </a:r>
             <a:endParaRPr lang="de-AT" sz="1400" dirty="0"/>
           </a:p>
@@ -3645,7 +3645,7 @@
             <a:pPr algn="ctr"/>
             <a:r>
               <a:rPr lang="de-AT" sz="1400" dirty="0" smtClean="0"/>
-              <a:t>*Problem</a:t>
+              <a:t>Problems.*</a:t>
             </a:r>
             <a:endParaRPr lang="de-AT" sz="1400" dirty="0"/>
           </a:p>
@@ -3689,7 +3689,7 @@
             <a:pPr algn="ctr"/>
             <a:r>
               <a:rPr lang="de-AT" sz="1400" dirty="0" smtClean="0"/>
-              <a:t>*Algorithm</a:t>
+              <a:t>Algorithms.*</a:t>
             </a:r>
             <a:endParaRPr lang="de-AT" sz="1400" dirty="0"/>
           </a:p>
@@ -3885,8 +3885,8 @@
         </p:nvSpPr>
         <p:spPr>
           <a:xfrm>
-            <a:off x="5796136" y="4005064"/>
-            <a:ext cx="1656184" cy="331237"/>
+            <a:off x="4932040" y="4005064"/>
+            <a:ext cx="1660521" cy="331237"/>
           </a:xfrm>
           <a:prstGeom prst="rect">
             <a:avLst/>
@@ -4091,7 +4091,7 @@
             <a:pPr algn="ctr"/>
             <a:r>
               <a:rPr lang="de-AT" sz="1400" dirty="0" smtClean="0"/>
-              <a:t>*Instances</a:t>
+              <a:t>Instances.*</a:t>
             </a:r>
             <a:endParaRPr lang="de-AT" sz="1400" dirty="0"/>
           </a:p>
@@ -4105,8 +4105,8 @@
         </p:nvSpPr>
         <p:spPr>
           <a:xfrm>
-            <a:off x="5796136" y="3284984"/>
-            <a:ext cx="1656184" cy="648072"/>
+            <a:off x="4932040" y="3573016"/>
+            <a:ext cx="1660521" cy="339272"/>
           </a:xfrm>
           <a:prstGeom prst="rect">
             <a:avLst/>
@@ -4222,8 +4222,8 @@
           <a:p>
             <a:pPr algn="ctr"/>
             <a:r>
-              <a:rPr lang="de-AT" sz="1400" dirty="0" smtClean="0"/>
-              <a:t>Controls</a:t>
+              <a:rPr lang="de-AT" sz="1400" dirty="0" err="1" smtClean="0"/>
+              <a:t>ControlExtensions</a:t>
             </a:r>
             <a:endParaRPr lang="de-AT" sz="1400" dirty="0"/>
           </a:p>
@@ -4231,14 +4231,14 @@
       </p:sp>
       <p:sp>
         <p:nvSpPr>
-          <p:cNvPr id="40" name="Rectangle 39"/>
+          <p:cNvPr id="41" name="Rectangle 40"/>
           <p:cNvSpPr/>
           <p:nvPr/>
         </p:nvSpPr>
         <p:spPr>
-          <a:xfrm>
-            <a:off x="4932040" y="3284984"/>
-            <a:ext cx="792088" cy="1051317"/>
+          <a:xfrm flipH="1">
+            <a:off x="6661294" y="1340767"/>
+            <a:ext cx="791026" cy="2995533"/>
           </a:xfrm>
           <a:prstGeom prst="rect">
             <a:avLst/>
@@ -4267,51 +4267,7 @@
             <a:pPr algn="ctr"/>
             <a:r>
               <a:rPr lang="de-AT" sz="1400" dirty="0" smtClean="0"/>
-              <a:t>*Views</a:t>
-            </a:r>
-            <a:endParaRPr lang="de-AT" sz="1400" dirty="0"/>
-          </a:p>
-        </p:txBody>
-      </p:sp>
-      <p:sp>
-        <p:nvSpPr>
-          <p:cNvPr id="41" name="Rectangle 40"/>
-          <p:cNvSpPr/>
-          <p:nvPr/>
-        </p:nvSpPr>
-        <p:spPr>
-          <a:xfrm>
-            <a:off x="4932040" y="1340768"/>
-            <a:ext cx="2520280" cy="1440160"/>
-          </a:xfrm>
-          <a:prstGeom prst="rect">
-            <a:avLst/>
-          </a:prstGeom>
-        </p:spPr>
-        <p:style>
-          <a:lnRef idx="2">
-            <a:schemeClr val="accent6">
-              <a:shade val="50000"/>
-            </a:schemeClr>
-          </a:lnRef>
-          <a:fillRef idx="1">
-            <a:schemeClr val="accent6"/>
-          </a:fillRef>
-          <a:effectRef idx="0">
-            <a:schemeClr val="accent6"/>
-          </a:effectRef>
-          <a:fontRef idx="minor">
-            <a:schemeClr val="lt1"/>
-          </a:fontRef>
-        </p:style>
-        <p:txBody>
-          <a:bodyPr rtlCol="0" anchor="ctr"/>
-          <a:lstStyle/>
-          <a:p>
-            <a:pPr algn="ctr"/>
-            <a:r>
-              <a:rPr lang="de-AT" sz="1400" dirty="0" smtClean="0"/>
-              <a:t>*Views</a:t>
+              <a:t>*.Views</a:t>
             </a:r>
             <a:endParaRPr lang="de-AT" sz="1400" dirty="0"/>
           </a:p>
@@ -4467,8 +4423,8 @@
         </p:nvSpPr>
         <p:spPr>
           <a:xfrm>
-            <a:off x="4932040" y="2852936"/>
-            <a:ext cx="2520280" cy="360040"/>
+            <a:off x="4932039" y="3140963"/>
+            <a:ext cx="1660521" cy="331241"/>
           </a:xfrm>
           <a:prstGeom prst="rect">
             <a:avLst/>
@@ -4514,8 +4470,16 @@
           <a:p>
             <a:pPr algn="ctr"/>
             <a:r>
+              <a:rPr lang="de-AT" sz="1400" dirty="0" err="1" smtClean="0"/>
+              <a:t>Programmable</a:t>
+            </a:r>
+            <a:r>
+              <a:rPr lang="de-AT" sz="1400" dirty="0"/>
+              <a:t> </a:t>
+            </a:r>
+            <a:r>
               <a:rPr lang="de-AT" sz="1400" dirty="0" smtClean="0"/>
-              <a:t>ProgrammableOperator</a:t>
+              <a:t>Op.</a:t>
             </a:r>
             <a:endParaRPr lang="de-AT" sz="1400" dirty="0"/>
           </a:p>

</xml_diff>